<commit_message>
Aggiunto diagramma a flusso nel powerpoint
</commit_message>
<xml_diff>
--- a/Presentazione.pptx
+++ b/Presentazione.pptx
@@ -9,10 +9,10 @@
     <p:sldId id="257" r:id="rId3"/>
     <p:sldId id="258" r:id="rId4"/>
     <p:sldId id="259" r:id="rId5"/>
-    <p:sldId id="260" r:id="rId6"/>
-    <p:sldId id="261" r:id="rId7"/>
-    <p:sldId id="262" r:id="rId8"/>
-    <p:sldId id="263" r:id="rId9"/>
+    <p:sldId id="261" r:id="rId6"/>
+    <p:sldId id="262" r:id="rId7"/>
+    <p:sldId id="268" r:id="rId8"/>
+    <p:sldId id="260" r:id="rId9"/>
     <p:sldId id="264" r:id="rId10"/>
     <p:sldId id="265" r:id="rId11"/>
     <p:sldId id="266" r:id="rId12"/>
@@ -3580,7 +3580,7 @@
               <a:t>Janath</a:t>
             </a:r>
             <a:r>
-              <a:rPr lang="it-IT" sz="1600">
+              <a:rPr lang="it-IT" sz="1600" dirty="0">
                 <a:latin typeface="Arial" panose="020B0604020202020204" pitchFamily="34" charset="0"/>
                 <a:ea typeface="Apple Symbols" panose="02000000000000000000" pitchFamily="2" charset="-79"/>
                 <a:cs typeface="Arial" panose="020B0604020202020204" pitchFamily="34" charset="0"/>
@@ -3588,7 +3588,7 @@
               <a:t> </a:t>
             </a:r>
             <a:r>
-              <a:rPr lang="it-IT" sz="1600" err="1">
+              <a:rPr lang="it-IT" sz="1600" dirty="0" err="1">
                 <a:latin typeface="Arial" panose="020B0604020202020204" pitchFamily="34" charset="0"/>
                 <a:ea typeface="Apple Symbols" panose="02000000000000000000" pitchFamily="2" charset="-79"/>
                 <a:cs typeface="Arial" panose="020B0604020202020204" pitchFamily="34" charset="0"/>
@@ -3596,7 +3596,7 @@
               <a:t>Uthayakumar</a:t>
             </a:r>
             <a:r>
-              <a:rPr lang="it-IT" sz="1600">
+              <a:rPr lang="it-IT" sz="1600" dirty="0">
                 <a:latin typeface="Arial" panose="020B0604020202020204" pitchFamily="34" charset="0"/>
                 <a:ea typeface="Apple Symbols" panose="02000000000000000000" pitchFamily="2" charset="-79"/>
                 <a:cs typeface="Arial" panose="020B0604020202020204" pitchFamily="34" charset="0"/>
@@ -3872,7 +3872,7 @@
           <a:bodyPr/>
           <a:lstStyle/>
           <a:p>
-            <a:endParaRPr lang="it-IT"/>
+            <a:endParaRPr lang="it-IT" dirty="0"/>
           </a:p>
         </p:txBody>
       </p:sp>
@@ -4798,7 +4798,7 @@
           <a:lstStyle/>
           <a:p>
             <a:r>
-              <a:rPr lang="it-IT"/>
+              <a:rPr lang="it-IT" dirty="0"/>
               <a:t>Suddiviso in 4 parti:</a:t>
             </a:r>
           </a:p>
@@ -4808,19 +4808,19 @@
               <a:buChar char="§"/>
             </a:pPr>
             <a:r>
-              <a:rPr lang="it-IT" sz="1800" err="1"/>
+              <a:rPr lang="it-IT" sz="1800" dirty="0" err="1"/>
               <a:t>JSON_Dataset</a:t>
             </a:r>
             <a:r>
-              <a:rPr lang="it-IT" sz="1800"/>
+              <a:rPr lang="it-IT" sz="1800" dirty="0"/>
               <a:t>: 		Creazione da file </a:t>
             </a:r>
             <a:r>
-              <a:rPr lang="it-IT" sz="1800" err="1"/>
+              <a:rPr lang="it-IT" sz="1800" dirty="0" err="1"/>
               <a:t>json</a:t>
             </a:r>
             <a:r>
-              <a:rPr lang="it-IT" sz="1800"/>
+              <a:rPr lang="it-IT" sz="1800" dirty="0"/>
               <a:t> di un file csv </a:t>
             </a:r>
           </a:p>
@@ -4830,14 +4830,14 @@
               <a:buChar char="§"/>
             </a:pPr>
             <a:r>
-              <a:rPr lang="it-IT" sz="1800" err="1"/>
+              <a:rPr lang="it-IT" sz="1800" dirty="0" err="1"/>
               <a:t>Indexing_Database</a:t>
             </a:r>
             <a:r>
-              <a:rPr lang="it-IT" sz="1800"/>
+              <a:rPr lang="it-IT" sz="1800" dirty="0"/>
               <a:t>:		Creazione index dal file csv</a:t>
             </a:r>
-            <a:endParaRPr lang="it-IT" sz="1800">
+            <a:endParaRPr lang="it-IT" sz="1800" dirty="0">
               <a:sym typeface="Wingdings" pitchFamily="2" charset="2"/>
             </a:endParaRPr>
           </a:p>
@@ -4847,11 +4847,11 @@
               <a:buChar char="§"/>
             </a:pPr>
             <a:r>
-              <a:rPr lang="it-IT" sz="1800" err="1"/>
+              <a:rPr lang="it-IT" sz="1800" dirty="0" err="1"/>
               <a:t>Search_and_Result</a:t>
             </a:r>
             <a:r>
-              <a:rPr lang="it-IT" sz="1800"/>
+              <a:rPr lang="it-IT" sz="1800" dirty="0"/>
               <a:t>:		Ricerca nell’index ed elaborazione risultati </a:t>
             </a:r>
           </a:p>
@@ -4861,7 +4861,7 @@
               <a:buChar char="§"/>
             </a:pPr>
             <a:r>
-              <a:rPr lang="it-IT" sz="1800"/>
+              <a:rPr lang="it-IT" sz="1800" dirty="0"/>
               <a:t>Benchmark:	 		Benchmark su risultati ottenuti da alcune query</a:t>
             </a:r>
           </a:p>
@@ -5046,7 +5046,12 @@
             <p:ph idx="1"/>
           </p:nvPr>
         </p:nvSpPr>
-        <p:spPr/>
+        <p:spPr>
+          <a:xfrm>
+            <a:off x="505342" y="1765116"/>
+            <a:ext cx="7128835" cy="4276910"/>
+          </a:xfrm>
+        </p:spPr>
         <p:txBody>
           <a:bodyPr/>
           <a:lstStyle/>
@@ -5059,13 +5064,13 @@
           <a:p>
             <a:r>
               <a:rPr lang="it-IT" dirty="0"/>
-              <a:t>Possibilità utilizzo OR/AND </a:t>
+              <a:t>Operatori booleani OR/AND/ NOT</a:t>
             </a:r>
           </a:p>
           <a:p>
             <a:r>
               <a:rPr lang="it-IT" dirty="0"/>
-              <a:t>Doppi apici ("") per </a:t>
+              <a:t>Doppi apici (" ") per </a:t>
             </a:r>
             <a:r>
               <a:rPr lang="it-IT" dirty="0" err="1"/>
@@ -5084,17 +5089,140 @@
           <a:p>
             <a:r>
               <a:rPr lang="it-IT" dirty="0"/>
-              <a:t>…….</a:t>
-            </a:r>
-          </a:p>
-          <a:p>
+              <a:t>Ricerca su field</a:t>
+            </a:r>
+          </a:p>
+          <a:p>
+            <a:r>
+              <a:rPr lang="it-IT" dirty="0"/>
+              <a:t>Wildcard queries (? O *)</a:t>
+            </a:r>
+          </a:p>
+          <a:p>
+            <a:r>
+              <a:rPr lang="it-IT" dirty="0"/>
+              <a:t>Range queries</a:t>
+            </a:r>
+          </a:p>
+          <a:p>
+            <a:pPr marL="0" indent="0">
+              <a:buNone/>
+            </a:pPr>
             <a:endParaRPr lang="it-IT" dirty="0"/>
           </a:p>
           <a:p>
+            <a:pPr marL="0" indent="0">
+              <a:buNone/>
+            </a:pPr>
+            <a:r>
+              <a:rPr lang="it-IT" dirty="0"/>
+              <a:t>I filtri possono essere usati in combinazione.</a:t>
+            </a:r>
+          </a:p>
+          <a:p>
             <a:endParaRPr lang="it-IT" dirty="0"/>
           </a:p>
-        </p:txBody>
-      </p:sp>
+          <a:p>
+            <a:endParaRPr lang="it-IT" dirty="0"/>
+          </a:p>
+          <a:p>
+            <a:endParaRPr lang="it-IT" dirty="0"/>
+          </a:p>
+          <a:p>
+            <a:endParaRPr lang="it-IT" dirty="0"/>
+          </a:p>
+        </p:txBody>
+      </p:sp>
+      <p:pic>
+        <p:nvPicPr>
+          <p:cNvPr id="11" name="Immagine 10">
+            <a:extLst>
+              <a:ext uri="{FF2B5EF4-FFF2-40B4-BE49-F238E27FC236}">
+                <a16:creationId xmlns:a16="http://schemas.microsoft.com/office/drawing/2014/main" id="{0F505B32-F830-39D2-D0EC-FA2210002C34}"/>
+              </a:ext>
+            </a:extLst>
+          </p:cNvPr>
+          <p:cNvPicPr>
+            <a:picLocks noChangeAspect="1"/>
+          </p:cNvPicPr>
+          <p:nvPr/>
+        </p:nvPicPr>
+        <p:blipFill>
+          <a:blip r:embed="rId2"/>
+          <a:stretch>
+            <a:fillRect/>
+          </a:stretch>
+        </p:blipFill>
+        <p:spPr>
+          <a:xfrm>
+            <a:off x="8537830" y="365125"/>
+            <a:ext cx="1850474" cy="1004705"/>
+          </a:xfrm>
+          <a:prstGeom prst="rect">
+            <a:avLst/>
+          </a:prstGeom>
+        </p:spPr>
+      </p:pic>
+      <p:pic>
+        <p:nvPicPr>
+          <p:cNvPr id="15" name="Immagine 14">
+            <a:extLst>
+              <a:ext uri="{FF2B5EF4-FFF2-40B4-BE49-F238E27FC236}">
+                <a16:creationId xmlns:a16="http://schemas.microsoft.com/office/drawing/2014/main" id="{50BEE64F-9231-0FF8-C80A-D0408B9F092F}"/>
+              </a:ext>
+            </a:extLst>
+          </p:cNvPr>
+          <p:cNvPicPr>
+            <a:picLocks noChangeAspect="1"/>
+          </p:cNvPicPr>
+          <p:nvPr/>
+        </p:nvPicPr>
+        <p:blipFill>
+          <a:blip r:embed="rId3"/>
+          <a:stretch>
+            <a:fillRect/>
+          </a:stretch>
+        </p:blipFill>
+        <p:spPr>
+          <a:xfrm>
+            <a:off x="7860886" y="2111468"/>
+            <a:ext cx="3947641" cy="1558999"/>
+          </a:xfrm>
+          <a:prstGeom prst="rect">
+            <a:avLst/>
+          </a:prstGeom>
+        </p:spPr>
+      </p:pic>
+      <p:pic>
+        <p:nvPicPr>
+          <p:cNvPr id="17" name="Immagine 16">
+            <a:extLst>
+              <a:ext uri="{FF2B5EF4-FFF2-40B4-BE49-F238E27FC236}">
+                <a16:creationId xmlns:a16="http://schemas.microsoft.com/office/drawing/2014/main" id="{CE5CE056-3D46-D3A8-5812-34122041119E}"/>
+              </a:ext>
+            </a:extLst>
+          </p:cNvPr>
+          <p:cNvPicPr>
+            <a:picLocks noChangeAspect="1"/>
+          </p:cNvPicPr>
+          <p:nvPr/>
+        </p:nvPicPr>
+        <p:blipFill>
+          <a:blip r:embed="rId4"/>
+          <a:stretch>
+            <a:fillRect/>
+          </a:stretch>
+        </p:blipFill>
+        <p:spPr>
+          <a:xfrm>
+            <a:off x="7860886" y="4091247"/>
+            <a:ext cx="3947641" cy="1542334"/>
+          </a:xfrm>
+          <a:prstGeom prst="rect">
+            <a:avLst/>
+          </a:prstGeom>
+        </p:spPr>
+      </p:pic>
     </p:spTree>
     <p:extLst>
       <p:ext uri="{BB962C8B-B14F-4D97-AF65-F5344CB8AC3E}">
@@ -5130,7 +5258,7 @@
           <p:cNvPr id="2" name="Titolo 1">
             <a:extLst>
               <a:ext uri="{FF2B5EF4-FFF2-40B4-BE49-F238E27FC236}">
-                <a16:creationId xmlns:a16="http://schemas.microsoft.com/office/drawing/2014/main" id="{3FB7BD36-6808-7F4B-1A10-1F7439A2FC8C}"/>
+                <a16:creationId xmlns:a16="http://schemas.microsoft.com/office/drawing/2014/main" id="{16AC6858-5A09-2A0B-8BC4-085A441FF3BE}"/>
               </a:ext>
             </a:extLst>
           </p:cNvPr>
@@ -5148,9 +5276,18 @@
           <a:p>
             <a:pPr algn="ctr"/>
             <a:r>
+              <a:rPr lang="it-IT" b="1" dirty="0" err="1"/>
+              <a:t>Indexing</a:t>
+            </a:r>
+            <a:r>
               <a:rPr lang="it-IT" b="1" dirty="0"/>
-              <a:t>Query di esempio</a:t>
-            </a:r>
+              <a:t> e </a:t>
+            </a:r>
+            <a:r>
+              <a:rPr lang="it-IT" b="1" dirty="0" err="1"/>
+              <a:t>Preprocessing</a:t>
+            </a:r>
+            <a:endParaRPr lang="it-IT" b="1" dirty="0"/>
           </a:p>
         </p:txBody>
       </p:sp>
@@ -5159,7 +5296,7 @@
           <p:cNvPr id="3" name="Segnaposto contenuto 2">
             <a:extLst>
               <a:ext uri="{FF2B5EF4-FFF2-40B4-BE49-F238E27FC236}">
-                <a16:creationId xmlns:a16="http://schemas.microsoft.com/office/drawing/2014/main" id="{D3AA2707-D593-2B13-210B-9BD11F4DBA5B}"/>
+                <a16:creationId xmlns:a16="http://schemas.microsoft.com/office/drawing/2014/main" id="{ACB955E9-9253-9282-4AAE-AEA9C1D6C07D}"/>
               </a:ext>
             </a:extLst>
           </p:cNvPr>
@@ -5170,19 +5307,147 @@
             <p:ph idx="1"/>
           </p:nvPr>
         </p:nvSpPr>
-        <p:spPr/>
-        <p:txBody>
-          <a:bodyPr/>
-          <a:lstStyle/>
-          <a:p>
+        <p:spPr>
+          <a:xfrm>
+            <a:off x="317205" y="1690688"/>
+            <a:ext cx="7412665" cy="4351338"/>
+          </a:xfrm>
+        </p:spPr>
+        <p:txBody>
+          <a:bodyPr/>
+          <a:lstStyle/>
+          <a:p>
+            <a:pPr marL="0" indent="0">
+              <a:buNone/>
+            </a:pPr>
+            <a:r>
+              <a:rPr lang="it-IT" dirty="0" err="1"/>
+              <a:t>Whoosh</a:t>
+            </a:r>
+            <a:r>
+              <a:rPr lang="it-IT" dirty="0"/>
+              <a:t> consente la creazione di un index.</a:t>
+            </a:r>
+          </a:p>
+          <a:p>
+            <a:pPr marL="0" indent="0">
+              <a:buNone/>
+            </a:pPr>
+            <a:r>
+              <a:rPr lang="it-IT" dirty="0"/>
+              <a:t>Attraverso uno schema vengono specificati i campi dei documenti nell'index.</a:t>
+            </a:r>
+          </a:p>
+          <a:p>
+            <a:pPr marL="0" indent="0">
+              <a:buNone/>
+            </a:pPr>
             <a:endParaRPr lang="it-IT" dirty="0"/>
           </a:p>
-        </p:txBody>
-      </p:sp>
+          <a:p>
+            <a:pPr marL="0" indent="0">
+              <a:buNone/>
+            </a:pPr>
+            <a:r>
+              <a:rPr lang="it-IT" dirty="0"/>
+              <a:t>Il </a:t>
+            </a:r>
+            <a:r>
+              <a:rPr lang="it-IT" dirty="0" err="1"/>
+              <a:t>preprocessing</a:t>
+            </a:r>
+            <a:r>
+              <a:rPr lang="it-IT" dirty="0"/>
+              <a:t> viene effettuato attraverso:</a:t>
+            </a:r>
+          </a:p>
+          <a:p>
+            <a:pPr lvl="1"/>
+            <a:r>
+              <a:rPr lang="it-IT" dirty="0"/>
+              <a:t>Analisi lessicale del testo.</a:t>
+            </a:r>
+          </a:p>
+          <a:p>
+            <a:pPr lvl="1"/>
+            <a:r>
+              <a:rPr lang="it-IT" dirty="0"/>
+              <a:t>Eliminazione delle </a:t>
+            </a:r>
+            <a:r>
+              <a:rPr lang="it-IT" dirty="0" err="1"/>
+              <a:t>stopwords</a:t>
+            </a:r>
+            <a:r>
+              <a:rPr lang="it-IT" dirty="0"/>
+              <a:t>.</a:t>
+            </a:r>
+          </a:p>
+          <a:p>
+            <a:pPr lvl="1"/>
+            <a:r>
+              <a:rPr lang="it-IT" dirty="0" err="1"/>
+              <a:t>Stemming</a:t>
+            </a:r>
+            <a:r>
+              <a:rPr lang="it-IT" dirty="0"/>
+              <a:t> e </a:t>
+            </a:r>
+            <a:r>
+              <a:rPr lang="it-IT" dirty="0" err="1"/>
+              <a:t>lematizzazione</a:t>
+            </a:r>
+            <a:r>
+              <a:rPr lang="it-IT" dirty="0"/>
+              <a:t>.</a:t>
+            </a:r>
+          </a:p>
+          <a:p>
+            <a:pPr marL="457200" lvl="1" indent="0">
+              <a:buNone/>
+            </a:pPr>
+            <a:endParaRPr lang="it-IT" sz="2000" dirty="0"/>
+          </a:p>
+          <a:p>
+            <a:pPr lvl="1"/>
+            <a:endParaRPr lang="it-IT" sz="2000" dirty="0"/>
+          </a:p>
+        </p:txBody>
+      </p:sp>
+      <p:pic>
+        <p:nvPicPr>
+          <p:cNvPr id="6" name="Immagine 5">
+            <a:extLst>
+              <a:ext uri="{FF2B5EF4-FFF2-40B4-BE49-F238E27FC236}">
+                <a16:creationId xmlns:a16="http://schemas.microsoft.com/office/drawing/2014/main" id="{E025E8C8-8F3C-B12C-7D70-B7D4E4874445}"/>
+              </a:ext>
+            </a:extLst>
+          </p:cNvPr>
+          <p:cNvPicPr>
+            <a:picLocks noChangeAspect="1"/>
+          </p:cNvPicPr>
+          <p:nvPr/>
+        </p:nvPicPr>
+        <p:blipFill>
+          <a:blip r:embed="rId2"/>
+          <a:stretch>
+            <a:fillRect/>
+          </a:stretch>
+        </p:blipFill>
+        <p:spPr>
+          <a:xfrm>
+            <a:off x="7310770" y="2551800"/>
+            <a:ext cx="4564025" cy="2629114"/>
+          </a:xfrm>
+          <a:prstGeom prst="rect">
+            <a:avLst/>
+          </a:prstGeom>
+        </p:spPr>
+      </p:pic>
     </p:spTree>
     <p:extLst>
       <p:ext uri="{BB962C8B-B14F-4D97-AF65-F5344CB8AC3E}">
-        <p14:creationId xmlns:p14="http://schemas.microsoft.com/office/powerpoint/2010/main" val="980131250"/>
+        <p14:creationId xmlns:p14="http://schemas.microsoft.com/office/powerpoint/2010/main" val="2741175170"/>
       </p:ext>
     </p:extLst>
   </p:cSld>
@@ -5214,7 +5479,7 @@
           <p:cNvPr id="2" name="Titolo 1">
             <a:extLst>
               <a:ext uri="{FF2B5EF4-FFF2-40B4-BE49-F238E27FC236}">
-                <a16:creationId xmlns:a16="http://schemas.microsoft.com/office/drawing/2014/main" id="{16AC6858-5A09-2A0B-8BC4-085A441FF3BE}"/>
+                <a16:creationId xmlns:a16="http://schemas.microsoft.com/office/drawing/2014/main" id="{70A247E5-AE83-6ED2-37E0-9AA16285B1C3}"/>
               </a:ext>
             </a:extLst>
           </p:cNvPr>
@@ -5232,42 +5497,192 @@
           <a:p>
             <a:pPr algn="ctr"/>
             <a:r>
+              <a:rPr lang="it-IT" b="1" dirty="0"/>
+              <a:t>Query Expansion</a:t>
+            </a:r>
+          </a:p>
+        </p:txBody>
+      </p:sp>
+      <p:sp>
+        <p:nvSpPr>
+          <p:cNvPr id="3" name="Segnaposto contenuto 2">
+            <a:extLst>
+              <a:ext uri="{FF2B5EF4-FFF2-40B4-BE49-F238E27FC236}">
+                <a16:creationId xmlns:a16="http://schemas.microsoft.com/office/drawing/2014/main" id="{C327502E-C82F-6F70-3C53-3ABC4C063CAF}"/>
+              </a:ext>
+            </a:extLst>
+          </p:cNvPr>
+          <p:cNvSpPr>
+            <a:spLocks noGrp="1"/>
+          </p:cNvSpPr>
+          <p:nvPr>
+            <p:ph idx="1"/>
+          </p:nvPr>
+        </p:nvSpPr>
+        <p:spPr>
+          <a:xfrm>
+            <a:off x="497959" y="1592595"/>
+            <a:ext cx="7328185" cy="4351338"/>
+          </a:xfrm>
+        </p:spPr>
+        <p:txBody>
+          <a:bodyPr/>
+          <a:lstStyle/>
+          <a:p>
+            <a:pPr marL="0" indent="0">
+              <a:buNone/>
+            </a:pPr>
+            <a:r>
+              <a:rPr lang="it-IT" dirty="0"/>
+              <a:t>Due tipologie di ricerca:</a:t>
+            </a:r>
+          </a:p>
+          <a:p>
+            <a:r>
+              <a:rPr lang="it-IT" b="1" dirty="0"/>
+              <a:t>Ricerca precisa:</a:t>
+            </a:r>
+          </a:p>
+          <a:p>
+            <a:pPr lvl="1">
+              <a:buFontTx/>
+              <a:buChar char="-"/>
+            </a:pPr>
+            <a:r>
+              <a:rPr lang="it-IT" dirty="0"/>
+              <a:t>Effettuata tramite doppi apici (" ").</a:t>
+            </a:r>
+          </a:p>
+          <a:p>
+            <a:pPr lvl="1">
+              <a:buFontTx/>
+              <a:buChar char="-"/>
+            </a:pPr>
+            <a:r>
+              <a:rPr lang="it-IT" dirty="0"/>
+              <a:t>Ricerca solo le parole inserite nella query.</a:t>
+            </a:r>
+          </a:p>
+          <a:p>
+            <a:r>
+              <a:rPr lang="it-IT" b="1" dirty="0"/>
+              <a:t>Ricerca non precisa:</a:t>
+            </a:r>
+          </a:p>
+          <a:p>
+            <a:pPr lvl="1">
+              <a:buFontTx/>
+              <a:buChar char="-"/>
+            </a:pPr>
+            <a:r>
+              <a:rPr lang="it-IT" dirty="0"/>
+              <a:t>Le parole vengono separate.</a:t>
+            </a:r>
+          </a:p>
+          <a:p>
+            <a:pPr lvl="1">
+              <a:buFontTx/>
+              <a:buChar char="-"/>
+            </a:pPr>
+            <a:r>
+              <a:rPr lang="it-IT" dirty="0"/>
+              <a:t>Per ciascuna parola vengono cercati i suoi sinonimi.</a:t>
+            </a:r>
+          </a:p>
+          <a:p>
+            <a:pPr lvl="1">
+              <a:buFontTx/>
+              <a:buChar char="-"/>
+            </a:pPr>
+            <a:r>
+              <a:rPr lang="it-IT" dirty="0"/>
+              <a:t>L'espansione della query viene fatta tramite thesaurus </a:t>
+            </a:r>
+            <a:r>
               <a:rPr lang="it-IT" b="1" dirty="0" err="1"/>
-              <a:t>Preprocessing</a:t>
-            </a:r>
-            <a:endParaRPr lang="it-IT" b="1" dirty="0"/>
-          </a:p>
-        </p:txBody>
-      </p:sp>
-      <p:sp>
-        <p:nvSpPr>
-          <p:cNvPr id="3" name="Segnaposto contenuto 2">
-            <a:extLst>
-              <a:ext uri="{FF2B5EF4-FFF2-40B4-BE49-F238E27FC236}">
-                <a16:creationId xmlns:a16="http://schemas.microsoft.com/office/drawing/2014/main" id="{ACB955E9-9253-9282-4AAE-AEA9C1D6C07D}"/>
-              </a:ext>
-            </a:extLst>
-          </p:cNvPr>
-          <p:cNvSpPr>
-            <a:spLocks noGrp="1"/>
-          </p:cNvSpPr>
-          <p:nvPr>
-            <p:ph idx="1"/>
-          </p:nvPr>
-        </p:nvSpPr>
-        <p:spPr/>
-        <p:txBody>
-          <a:bodyPr/>
-          <a:lstStyle/>
-          <a:p>
-            <a:endParaRPr lang="it-IT"/>
-          </a:p>
-        </p:txBody>
-      </p:sp>
+              <a:t>Wordnet</a:t>
+            </a:r>
+            <a:r>
+              <a:rPr lang="it-IT" dirty="0"/>
+              <a:t>.</a:t>
+            </a:r>
+          </a:p>
+          <a:p>
+            <a:pPr lvl="1">
+              <a:buFontTx/>
+              <a:buChar char="-"/>
+            </a:pPr>
+            <a:r>
+              <a:rPr lang="it-IT" dirty="0"/>
+              <a:t>Si aggiungono i sinonimi alla lista di ricerca.</a:t>
+            </a:r>
+          </a:p>
+        </p:txBody>
+      </p:sp>
+      <p:pic>
+        <p:nvPicPr>
+          <p:cNvPr id="8" name="Immagine 7">
+            <a:extLst>
+              <a:ext uri="{FF2B5EF4-FFF2-40B4-BE49-F238E27FC236}">
+                <a16:creationId xmlns:a16="http://schemas.microsoft.com/office/drawing/2014/main" id="{AC13FADA-BA22-6CC5-C0D5-7DF8AC6E0F92}"/>
+              </a:ext>
+            </a:extLst>
+          </p:cNvPr>
+          <p:cNvPicPr>
+            <a:picLocks noChangeAspect="1"/>
+          </p:cNvPicPr>
+          <p:nvPr/>
+        </p:nvPicPr>
+        <p:blipFill>
+          <a:blip r:embed="rId2"/>
+          <a:stretch>
+            <a:fillRect/>
+          </a:stretch>
+        </p:blipFill>
+        <p:spPr>
+          <a:xfrm>
+            <a:off x="8166385" y="3884779"/>
+            <a:ext cx="3711659" cy="1950779"/>
+          </a:xfrm>
+          <a:prstGeom prst="rect">
+            <a:avLst/>
+          </a:prstGeom>
+        </p:spPr>
+      </p:pic>
+      <p:pic>
+        <p:nvPicPr>
+          <p:cNvPr id="9" name="Immagine 8">
+            <a:extLst>
+              <a:ext uri="{FF2B5EF4-FFF2-40B4-BE49-F238E27FC236}">
+                <a16:creationId xmlns:a16="http://schemas.microsoft.com/office/drawing/2014/main" id="{2190D382-6688-45D2-76AA-15194E7427F0}"/>
+              </a:ext>
+            </a:extLst>
+          </p:cNvPr>
+          <p:cNvPicPr>
+            <a:picLocks noChangeAspect="1"/>
+          </p:cNvPicPr>
+          <p:nvPr/>
+        </p:nvPicPr>
+        <p:blipFill>
+          <a:blip r:embed="rId3"/>
+          <a:stretch>
+            <a:fillRect/>
+          </a:stretch>
+        </p:blipFill>
+        <p:spPr>
+          <a:xfrm>
+            <a:off x="8166385" y="1592595"/>
+            <a:ext cx="3703902" cy="1950779"/>
+          </a:xfrm>
+          <a:prstGeom prst="rect">
+            <a:avLst/>
+          </a:prstGeom>
+        </p:spPr>
+      </p:pic>
     </p:spTree>
     <p:extLst>
       <p:ext uri="{BB962C8B-B14F-4D97-AF65-F5344CB8AC3E}">
-        <p14:creationId xmlns:p14="http://schemas.microsoft.com/office/powerpoint/2010/main" val="2741175170"/>
+        <p14:creationId xmlns:p14="http://schemas.microsoft.com/office/powerpoint/2010/main" val="3475301988"/>
       </p:ext>
     </p:extLst>
   </p:cSld>
@@ -5299,7 +5714,7 @@
           <p:cNvPr id="2" name="Titolo 1">
             <a:extLst>
               <a:ext uri="{FF2B5EF4-FFF2-40B4-BE49-F238E27FC236}">
-                <a16:creationId xmlns:a16="http://schemas.microsoft.com/office/drawing/2014/main" id="{70A247E5-AE83-6ED2-37E0-9AA16285B1C3}"/>
+                <a16:creationId xmlns:a16="http://schemas.microsoft.com/office/drawing/2014/main" id="{E1FF97B1-BDF9-060D-E736-89F7665C3A32}"/>
               </a:ext>
             </a:extLst>
           </p:cNvPr>
@@ -5318,40 +5733,45 @@
             <a:pPr algn="ctr"/>
             <a:r>
               <a:rPr lang="it-IT" b="1" dirty="0"/>
-              <a:t>Query Expansion</a:t>
-            </a:r>
-          </a:p>
-        </p:txBody>
-      </p:sp>
-      <p:sp>
-        <p:nvSpPr>
-          <p:cNvPr id="3" name="Segnaposto contenuto 2">
-            <a:extLst>
-              <a:ext uri="{FF2B5EF4-FFF2-40B4-BE49-F238E27FC236}">
-                <a16:creationId xmlns:a16="http://schemas.microsoft.com/office/drawing/2014/main" id="{C327502E-C82F-6F70-3C53-3ABC4C063CAF}"/>
-              </a:ext>
-            </a:extLst>
-          </p:cNvPr>
-          <p:cNvSpPr>
-            <a:spLocks noGrp="1"/>
-          </p:cNvSpPr>
+              <a:t>	</a:t>
+            </a:r>
+            <a:endParaRPr lang="it-IT" dirty="0"/>
+          </a:p>
+        </p:txBody>
+      </p:sp>
+      <p:pic>
+        <p:nvPicPr>
+          <p:cNvPr id="5" name="Segnaposto contenuto 4">
+            <a:extLst>
+              <a:ext uri="{FF2B5EF4-FFF2-40B4-BE49-F238E27FC236}">
+                <a16:creationId xmlns:a16="http://schemas.microsoft.com/office/drawing/2014/main" id="{A180C8C7-1C00-AA5E-4924-9EF632BD6688}"/>
+              </a:ext>
+            </a:extLst>
+          </p:cNvPr>
+          <p:cNvPicPr>
+            <a:picLocks noGrp="1" noChangeAspect="1"/>
+          </p:cNvPicPr>
           <p:nvPr>
             <p:ph idx="1"/>
           </p:nvPr>
-        </p:nvSpPr>
-        <p:spPr/>
-        <p:txBody>
-          <a:bodyPr/>
-          <a:lstStyle/>
-          <a:p>
-            <a:endParaRPr lang="it-IT" dirty="0"/>
-          </a:p>
-        </p:txBody>
-      </p:sp>
+        </p:nvPicPr>
+        <p:blipFill>
+          <a:blip r:embed="rId2"/>
+          <a:stretch>
+            <a:fillRect/>
+          </a:stretch>
+        </p:blipFill>
+        <p:spPr>
+          <a:xfrm>
+            <a:off x="1562985" y="365124"/>
+            <a:ext cx="8899451" cy="6260055"/>
+          </a:xfrm>
+        </p:spPr>
+      </p:pic>
     </p:spTree>
     <p:extLst>
       <p:ext uri="{BB962C8B-B14F-4D97-AF65-F5344CB8AC3E}">
-        <p14:creationId xmlns:p14="http://schemas.microsoft.com/office/powerpoint/2010/main" val="3475301988"/>
+        <p14:creationId xmlns:p14="http://schemas.microsoft.com/office/powerpoint/2010/main" val="1662031847"/>
       </p:ext>
     </p:extLst>
   </p:cSld>
@@ -5383,7 +5803,7 @@
           <p:cNvPr id="2" name="Titolo 1">
             <a:extLst>
               <a:ext uri="{FF2B5EF4-FFF2-40B4-BE49-F238E27FC236}">
-                <a16:creationId xmlns:a16="http://schemas.microsoft.com/office/drawing/2014/main" id="{3525A21F-022C-9E04-000F-9D17414D0BFB}"/>
+                <a16:creationId xmlns:a16="http://schemas.microsoft.com/office/drawing/2014/main" id="{3FB7BD36-6808-7F4B-1A10-1F7439A2FC8C}"/>
               </a:ext>
             </a:extLst>
           </p:cNvPr>
@@ -5402,13 +5822,8 @@
             <a:pPr algn="ctr"/>
             <a:r>
               <a:rPr lang="it-IT" b="1" dirty="0"/>
-              <a:t>Diagramma </a:t>
-            </a:r>
-            <a:r>
-              <a:rPr lang="it-IT" b="1" dirty="0" err="1"/>
-              <a:t>draw.io</a:t>
-            </a:r>
-            <a:endParaRPr lang="it-IT" b="1" dirty="0"/>
+              <a:t>Query di esempio</a:t>
+            </a:r>
           </a:p>
         </p:txBody>
       </p:sp>
@@ -5417,7 +5832,7 @@
           <p:cNvPr id="3" name="Segnaposto contenuto 2">
             <a:extLst>
               <a:ext uri="{FF2B5EF4-FFF2-40B4-BE49-F238E27FC236}">
-                <a16:creationId xmlns:a16="http://schemas.microsoft.com/office/drawing/2014/main" id="{CAB26EA7-9C0D-2786-A07C-539E775E7316}"/>
+                <a16:creationId xmlns:a16="http://schemas.microsoft.com/office/drawing/2014/main" id="{D3AA2707-D593-2B13-210B-9BD11F4DBA5B}"/>
               </a:ext>
             </a:extLst>
           </p:cNvPr>
@@ -5433,14 +5848,14 @@
           <a:bodyPr/>
           <a:lstStyle/>
           <a:p>
-            <a:endParaRPr lang="it-IT"/>
+            <a:endParaRPr lang="it-IT" dirty="0"/>
           </a:p>
         </p:txBody>
       </p:sp>
     </p:spTree>
     <p:extLst>
       <p:ext uri="{BB962C8B-B14F-4D97-AF65-F5344CB8AC3E}">
-        <p14:creationId xmlns:p14="http://schemas.microsoft.com/office/powerpoint/2010/main" val="1514722801"/>
+        <p14:creationId xmlns:p14="http://schemas.microsoft.com/office/powerpoint/2010/main" val="980131250"/>
       </p:ext>
     </p:extLst>
   </p:cSld>

</xml_diff>